<commit_message>
first version of lecture 6, create PDFs
</commit_message>
<xml_diff>
--- a/lectures/GenViz_Module6_Lecture.pptx
+++ b/lectures/GenViz_Module6_Lecture.pptx
@@ -5,16 +5,18 @@
     <p:sldMasterId id="2147483648" r:id="rId1"/>
   </p:sldMasterIdLst>
   <p:notesMasterIdLst>
-    <p:notesMasterId r:id="rId6"/>
+    <p:notesMasterId r:id="rId8"/>
   </p:notesMasterIdLst>
   <p:handoutMasterIdLst>
-    <p:handoutMasterId r:id="rId7"/>
+    <p:handoutMasterId r:id="rId9"/>
   </p:handoutMasterIdLst>
   <p:sldIdLst>
     <p:sldId id="256" r:id="rId2"/>
     <p:sldId id="259" r:id="rId3"/>
     <p:sldId id="260" r:id="rId4"/>
     <p:sldId id="257" r:id="rId5"/>
+    <p:sldId id="261" r:id="rId6"/>
+    <p:sldId id="262" r:id="rId7"/>
   </p:sldIdLst>
   <p:sldSz cx="9144000" cy="6858000" type="screen4x3"/>
   <p:notesSz cx="6858000" cy="9144000"/>
@@ -115,7 +117,7 @@
   </p:defaultTextStyle>
   <p:extLst>
     <p:ext uri="{EFAFB233-063F-42B5-8137-9DF3F51BA10A}">
-      <p15:sldGuideLst xmlns="" xmlns:p15="http://schemas.microsoft.com/office/powerpoint/2012/main">
+      <p15:sldGuideLst xmlns:p15="http://schemas.microsoft.com/office/powerpoint/2012/main" xmlns="">
         <p15:guide id="1" orient="horz" pos="2160">
           <p15:clr>
             <a:srgbClr val="A4A3A4"/>
@@ -215,7 +217,7 @@
             <a:fld id="{03643E35-CD80-874A-A3D7-254E954BB753}" type="datetimeFigureOut">
               <a:rPr lang="en-US" smtClean="0"/>
               <a:pPr/>
-              <a:t>8/25/17</a:t>
+              <a:t>9/11/17</a:t>
             </a:fld>
             <a:endParaRPr lang="en-US"/>
           </a:p>
@@ -382,7 +384,7 @@
             <a:fld id="{5C416C15-7665-174C-99B8-5B237ACA6582}" type="datetimeFigureOut">
               <a:rPr lang="en-US" smtClean="0"/>
               <a:pPr/>
-              <a:t>8/25/17</a:t>
+              <a:t>9/11/17</a:t>
             </a:fld>
             <a:endParaRPr lang="en-US"/>
           </a:p>
@@ -2948,15 +2950,7 @@
             </a:r>
             <a:r>
               <a:rPr lang="en-US" dirty="0" smtClean="0"/>
-              <a:t> Module </a:t>
-            </a:r>
-            <a:r>
-              <a:rPr lang="en-US" dirty="0" smtClean="0"/>
-              <a:t>6:</a:t>
-            </a:r>
-            <a:r>
-              <a:rPr lang="en-US" dirty="0" smtClean="0"/>
-              <a:t/>
+              <a:t> Module 6:</a:t>
             </a:r>
             <a:br>
               <a:rPr lang="en-US" dirty="0" smtClean="0"/>
@@ -2979,15 +2973,7 @@
             </a:r>
             <a:r>
               <a:rPr lang="en-US" dirty="0" smtClean="0"/>
-              <a:t>integrated assignments, and working with </a:t>
-            </a:r>
-            <a:r>
-              <a:rPr lang="en-US" dirty="0" smtClean="0"/>
-              <a:t>y</a:t>
-            </a:r>
-            <a:r>
-              <a:rPr lang="en-US" dirty="0" smtClean="0"/>
-              <a:t>our own data</a:t>
+              <a:t>integrated assignments, and working with your own data</a:t>
             </a:r>
             <a:endParaRPr lang="en-US" dirty="0"/>
           </a:p>
@@ -3345,11 +3331,7 @@
           <a:p>
             <a:r>
               <a:rPr lang="en-US" dirty="0" smtClean="0"/>
-              <a:t>Module </a:t>
-            </a:r>
-            <a:r>
-              <a:rPr lang="en-US" dirty="0" smtClean="0"/>
-              <a:t>3: </a:t>
+              <a:t>Module 3: </a:t>
             </a:r>
             <a:r>
               <a:rPr lang="en-US" dirty="0"/>
@@ -3371,11 +3353,7 @@
           <a:p>
             <a:r>
               <a:rPr lang="en-US" dirty="0" smtClean="0"/>
-              <a:t>Module </a:t>
-            </a:r>
-            <a:r>
-              <a:rPr lang="en-US" dirty="0" smtClean="0"/>
-              <a:t>5</a:t>
+              <a:t>Module 5</a:t>
             </a:r>
             <a:r>
               <a:rPr lang="en-US" dirty="0"/>
@@ -3386,11 +3364,7 @@
           <a:p>
             <a:r>
               <a:rPr lang="en-US" b="1" dirty="0" smtClean="0"/>
-              <a:t>Module </a:t>
-            </a:r>
-            <a:r>
-              <a:rPr lang="en-US" b="1" dirty="0" smtClean="0"/>
-              <a:t>6</a:t>
+              <a:t>Module 6</a:t>
             </a:r>
             <a:r>
               <a:rPr lang="en-US" b="1" dirty="0"/>
@@ -3481,11 +3455,7 @@
           <a:p>
             <a:r>
               <a:rPr lang="en-US" dirty="0" smtClean="0"/>
-              <a:t>Learning objectives of module </a:t>
-            </a:r>
-            <a:r>
-              <a:rPr lang="en-US" dirty="0" smtClean="0"/>
-              <a:t>6</a:t>
+              <a:t>Learning objectives of module 6</a:t>
             </a:r>
             <a:endParaRPr lang="en-US" dirty="0"/>
           </a:p>
@@ -3514,14 +3484,7 @@
               <a:rPr lang="en-US" dirty="0" smtClean="0"/>
               <a:t>data</a:t>
             </a:r>
-          </a:p>
-          <a:p>
-            <a:pPr lvl="1"/>
-            <a:r>
-              <a:rPr lang="mr-IN" smtClean="0"/>
-              <a:t>…</a:t>
-            </a:r>
-            <a:endParaRPr lang="en-US" dirty="0"/>
+            <a:endParaRPr lang="en-US" dirty="0" smtClean="0"/>
           </a:p>
         </p:txBody>
       </p:sp>
@@ -3542,6 +3505,235 @@
       </p:par>
     </p:tnLst>
   </p:timing>
+</p:sld>
+</file>
+
+<file path=ppt/slides/slide5.xml><?xml version="1.0" encoding="utf-8"?>
+<p:sld xmlns:a="http://schemas.openxmlformats.org/drawingml/2006/main" xmlns:r="http://schemas.openxmlformats.org/officeDocument/2006/relationships" xmlns:p="http://schemas.openxmlformats.org/presentationml/2006/main">
+  <p:cSld>
+    <p:spTree>
+      <p:nvGrpSpPr>
+        <p:cNvPr id="1" name=""/>
+        <p:cNvGrpSpPr/>
+        <p:nvPr/>
+      </p:nvGrpSpPr>
+      <p:grpSpPr>
+        <a:xfrm>
+          <a:off x="0" y="0"/>
+          <a:ext cx="0" cy="0"/>
+          <a:chOff x="0" y="0"/>
+          <a:chExt cx="0" cy="0"/>
+        </a:xfrm>
+      </p:grpSpPr>
+      <p:sp>
+        <p:nvSpPr>
+          <p:cNvPr id="2" name="Title 1"/>
+          <p:cNvSpPr>
+            <a:spLocks noGrp="1"/>
+          </p:cNvSpPr>
+          <p:nvPr>
+            <p:ph type="title"/>
+          </p:nvPr>
+        </p:nvSpPr>
+        <p:spPr/>
+        <p:txBody>
+          <a:bodyPr/>
+          <a:lstStyle/>
+          <a:p>
+            <a:r>
+              <a:rPr lang="en-US" dirty="0" smtClean="0"/>
+              <a:t>Questions and discussion</a:t>
+            </a:r>
+            <a:endParaRPr lang="en-US" dirty="0"/>
+          </a:p>
+        </p:txBody>
+      </p:sp>
+      <p:sp>
+        <p:nvSpPr>
+          <p:cNvPr id="3" name="Content Placeholder 2"/>
+          <p:cNvSpPr>
+            <a:spLocks noGrp="1"/>
+          </p:cNvSpPr>
+          <p:nvPr>
+            <p:ph idx="1"/>
+          </p:nvPr>
+        </p:nvSpPr>
+        <p:spPr/>
+        <p:txBody>
+          <a:bodyPr/>
+          <a:lstStyle/>
+          <a:p>
+            <a:pPr algn="ctr"/>
+            <a:endParaRPr lang="en-US" dirty="0" smtClean="0"/>
+          </a:p>
+          <a:p>
+            <a:pPr algn="ctr"/>
+            <a:endParaRPr lang="en-US" dirty="0"/>
+          </a:p>
+          <a:p>
+            <a:pPr algn="ctr"/>
+            <a:endParaRPr lang="en-US" dirty="0" smtClean="0"/>
+          </a:p>
+          <a:p>
+            <a:pPr algn="ctr"/>
+            <a:endParaRPr lang="en-US" dirty="0"/>
+          </a:p>
+          <a:p>
+            <a:pPr algn="ctr"/>
+            <a:endParaRPr lang="en-US" dirty="0" smtClean="0"/>
+          </a:p>
+          <a:p>
+            <a:pPr marL="0" indent="0" algn="ctr">
+              <a:buNone/>
+            </a:pPr>
+            <a:r>
+              <a:rPr lang="en-US" dirty="0" smtClean="0"/>
+              <a:t>Before </a:t>
+            </a:r>
+            <a:r>
+              <a:rPr lang="en-US" dirty="0"/>
+              <a:t>starting with the advanced exercises, are there any questions or topics for discussion?</a:t>
+            </a:r>
+          </a:p>
+          <a:p>
+            <a:pPr marL="0" indent="0" algn="ctr">
+              <a:buNone/>
+            </a:pPr>
+            <a:endParaRPr lang="en-US" dirty="0"/>
+          </a:p>
+        </p:txBody>
+      </p:sp>
+    </p:spTree>
+    <p:extLst>
+      <p:ext uri="{BB962C8B-B14F-4D97-AF65-F5344CB8AC3E}">
+        <p14:creationId xmlns:p14="http://schemas.microsoft.com/office/powerpoint/2010/main" val="1526631620"/>
+      </p:ext>
+    </p:extLst>
+  </p:cSld>
+  <p:clrMapOvr>
+    <a:masterClrMapping/>
+  </p:clrMapOvr>
+</p:sld>
+</file>
+
+<file path=ppt/slides/slide6.xml><?xml version="1.0" encoding="utf-8"?>
+<p:sld xmlns:a="http://schemas.openxmlformats.org/drawingml/2006/main" xmlns:r="http://schemas.openxmlformats.org/officeDocument/2006/relationships" xmlns:p="http://schemas.openxmlformats.org/presentationml/2006/main">
+  <p:cSld>
+    <p:spTree>
+      <p:nvGrpSpPr>
+        <p:cNvPr id="1" name=""/>
+        <p:cNvGrpSpPr/>
+        <p:nvPr/>
+      </p:nvGrpSpPr>
+      <p:grpSpPr>
+        <a:xfrm>
+          <a:off x="0" y="0"/>
+          <a:ext cx="0" cy="0"/>
+          <a:chOff x="0" y="0"/>
+          <a:chExt cx="0" cy="0"/>
+        </a:xfrm>
+      </p:grpSpPr>
+      <p:sp>
+        <p:nvSpPr>
+          <p:cNvPr id="2" name="Title 1"/>
+          <p:cNvSpPr>
+            <a:spLocks noGrp="1"/>
+          </p:cNvSpPr>
+          <p:nvPr>
+            <p:ph type="title"/>
+          </p:nvPr>
+        </p:nvSpPr>
+        <p:spPr/>
+        <p:txBody>
+          <a:bodyPr>
+            <a:normAutofit fontScale="90000"/>
+          </a:bodyPr>
+          <a:lstStyle/>
+          <a:p>
+            <a:r>
+              <a:rPr lang="en-US" dirty="0" smtClean="0"/>
+              <a:t>Integrated assignments and working with your own data</a:t>
+            </a:r>
+            <a:endParaRPr lang="en-US" dirty="0"/>
+          </a:p>
+        </p:txBody>
+      </p:sp>
+      <p:sp>
+        <p:nvSpPr>
+          <p:cNvPr id="3" name="Content Placeholder 2"/>
+          <p:cNvSpPr>
+            <a:spLocks noGrp="1"/>
+          </p:cNvSpPr>
+          <p:nvPr>
+            <p:ph idx="1"/>
+          </p:nvPr>
+        </p:nvSpPr>
+        <p:spPr/>
+        <p:txBody>
+          <a:bodyPr/>
+          <a:lstStyle/>
+          <a:p>
+            <a:pPr marL="0" indent="0">
+              <a:buNone/>
+            </a:pPr>
+            <a:r>
+              <a:rPr lang="en-US" dirty="0" smtClean="0"/>
+              <a:t>Two general options</a:t>
+            </a:r>
+          </a:p>
+          <a:p>
+            <a:endParaRPr lang="en-US" dirty="0"/>
+          </a:p>
+          <a:p>
+            <a:pPr marL="457200" indent="-457200">
+              <a:buFont typeface="+mj-lt"/>
+              <a:buAutoNum type="arabicPeriod"/>
+            </a:pPr>
+            <a:r>
+              <a:rPr lang="en-US" dirty="0" smtClean="0"/>
+              <a:t>If you have your own data. Try to apply something you learned this week to visualize that data</a:t>
+            </a:r>
+          </a:p>
+          <a:p>
+            <a:pPr marL="457200" indent="-457200">
+              <a:buFont typeface="+mj-lt"/>
+              <a:buAutoNum type="arabicPeriod"/>
+            </a:pPr>
+            <a:endParaRPr lang="en-US" dirty="0" smtClean="0"/>
+          </a:p>
+          <a:p>
+            <a:pPr marL="457200" indent="-457200">
+              <a:buFont typeface="+mj-lt"/>
+              <a:buAutoNum type="arabicPeriod"/>
+            </a:pPr>
+            <a:r>
+              <a:rPr lang="en-US" dirty="0" smtClean="0"/>
+              <a:t>If you don’t have your own data, there are optional integrated exercises in module 6 at </a:t>
+            </a:r>
+            <a:r>
+              <a:rPr lang="en-US" dirty="0" smtClean="0">
+                <a:hlinkClick r:id="rId2"/>
+              </a:rPr>
+              <a:t>www.GenViz.org</a:t>
+            </a:r>
+            <a:r>
+              <a:rPr lang="en-US" dirty="0" smtClean="0"/>
+              <a:t>  </a:t>
+            </a:r>
+            <a:endParaRPr lang="en-US" dirty="0"/>
+          </a:p>
+        </p:txBody>
+      </p:sp>
+    </p:spTree>
+    <p:extLst>
+      <p:ext uri="{BB962C8B-B14F-4D97-AF65-F5344CB8AC3E}">
+        <p14:creationId xmlns:p14="http://schemas.microsoft.com/office/powerpoint/2010/main" val="2647069494"/>
+      </p:ext>
+    </p:extLst>
+  </p:cSld>
+  <p:clrMapOvr>
+    <a:masterClrMapping/>
+  </p:clrMapOvr>
 </p:sld>
 </file>
 
@@ -3806,7 +3998,7 @@
   <a:extraClrSchemeLst/>
   <a:extLst>
     <a:ext uri="{05A4C25C-085E-4340-85A3-A5531E510DB2}">
-      <thm15:themeFamily xmlns="" xmlns:thm15="http://schemas.microsoft.com/office/thememl/2012/main" name="MGI_4-3_ratio_v1a" id="{9A0171FA-20F4-F840-B1C8-29D686AB0540}" vid="{60506783-C923-7847-B1CA-7C860CC95497}"/>
+      <thm15:themeFamily xmlns:thm15="http://schemas.microsoft.com/office/thememl/2012/main" xmlns="" name="MGI_4-3_ratio_v1a" id="{9A0171FA-20F4-F840-B1C8-29D686AB0540}" vid="{60506783-C923-7847-B1CA-7C860CC95497}"/>
     </a:ext>
   </a:extLst>
 </a:theme>

</xml_diff>